<commit_message>
Made Kalman filters functional
</commit_message>
<xml_diff>
--- a/Docs/Pics.pptx
+++ b/Docs/Pics.pptx
@@ -8,6 +8,8 @@
     <p:sldId id="256" r:id="rId2"/>
     <p:sldId id="257" r:id="rId3"/>
     <p:sldId id="258" r:id="rId4"/>
+    <p:sldId id="260" r:id="rId5"/>
+    <p:sldId id="259" r:id="rId6"/>
   </p:sldIdLst>
   <p:sldSz cx="12192000" cy="6858000"/>
   <p:notesSz cx="6858000" cy="9144000"/>
@@ -275,7 +277,7 @@
           <a:p>
             <a:fld id="{AA27FB6F-990B-4F02-B995-D654EC3D6263}" type="datetimeFigureOut">
               <a:rPr lang="en-IL" smtClean="0"/>
-              <a:t>25/01/2020</a:t>
+              <a:t>03/02/2020</a:t>
             </a:fld>
             <a:endParaRPr lang="en-IL"/>
           </a:p>
@@ -475,7 +477,7 @@
           <a:p>
             <a:fld id="{AA27FB6F-990B-4F02-B995-D654EC3D6263}" type="datetimeFigureOut">
               <a:rPr lang="en-IL" smtClean="0"/>
-              <a:t>25/01/2020</a:t>
+              <a:t>03/02/2020</a:t>
             </a:fld>
             <a:endParaRPr lang="en-IL"/>
           </a:p>
@@ -685,7 +687,7 @@
           <a:p>
             <a:fld id="{AA27FB6F-990B-4F02-B995-D654EC3D6263}" type="datetimeFigureOut">
               <a:rPr lang="en-IL" smtClean="0"/>
-              <a:t>25/01/2020</a:t>
+              <a:t>03/02/2020</a:t>
             </a:fld>
             <a:endParaRPr lang="en-IL"/>
           </a:p>
@@ -885,7 +887,7 @@
           <a:p>
             <a:fld id="{AA27FB6F-990B-4F02-B995-D654EC3D6263}" type="datetimeFigureOut">
               <a:rPr lang="en-IL" smtClean="0"/>
-              <a:t>25/01/2020</a:t>
+              <a:t>03/02/2020</a:t>
             </a:fld>
             <a:endParaRPr lang="en-IL"/>
           </a:p>
@@ -1161,7 +1163,7 @@
           <a:p>
             <a:fld id="{AA27FB6F-990B-4F02-B995-D654EC3D6263}" type="datetimeFigureOut">
               <a:rPr lang="en-IL" smtClean="0"/>
-              <a:t>25/01/2020</a:t>
+              <a:t>03/02/2020</a:t>
             </a:fld>
             <a:endParaRPr lang="en-IL"/>
           </a:p>
@@ -1429,7 +1431,7 @@
           <a:p>
             <a:fld id="{AA27FB6F-990B-4F02-B995-D654EC3D6263}" type="datetimeFigureOut">
               <a:rPr lang="en-IL" smtClean="0"/>
-              <a:t>25/01/2020</a:t>
+              <a:t>03/02/2020</a:t>
             </a:fld>
             <a:endParaRPr lang="en-IL"/>
           </a:p>
@@ -1844,7 +1846,7 @@
           <a:p>
             <a:fld id="{AA27FB6F-990B-4F02-B995-D654EC3D6263}" type="datetimeFigureOut">
               <a:rPr lang="en-IL" smtClean="0"/>
-              <a:t>25/01/2020</a:t>
+              <a:t>03/02/2020</a:t>
             </a:fld>
             <a:endParaRPr lang="en-IL"/>
           </a:p>
@@ -1986,7 +1988,7 @@
           <a:p>
             <a:fld id="{AA27FB6F-990B-4F02-B995-D654EC3D6263}" type="datetimeFigureOut">
               <a:rPr lang="en-IL" smtClean="0"/>
-              <a:t>25/01/2020</a:t>
+              <a:t>03/02/2020</a:t>
             </a:fld>
             <a:endParaRPr lang="en-IL"/>
           </a:p>
@@ -2099,7 +2101,7 @@
           <a:p>
             <a:fld id="{AA27FB6F-990B-4F02-B995-D654EC3D6263}" type="datetimeFigureOut">
               <a:rPr lang="en-IL" smtClean="0"/>
-              <a:t>25/01/2020</a:t>
+              <a:t>03/02/2020</a:t>
             </a:fld>
             <a:endParaRPr lang="en-IL"/>
           </a:p>
@@ -2412,7 +2414,7 @@
           <a:p>
             <a:fld id="{AA27FB6F-990B-4F02-B995-D654EC3D6263}" type="datetimeFigureOut">
               <a:rPr lang="en-IL" smtClean="0"/>
-              <a:t>25/01/2020</a:t>
+              <a:t>03/02/2020</a:t>
             </a:fld>
             <a:endParaRPr lang="en-IL"/>
           </a:p>
@@ -2701,7 +2703,7 @@
           <a:p>
             <a:fld id="{AA27FB6F-990B-4F02-B995-D654EC3D6263}" type="datetimeFigureOut">
               <a:rPr lang="en-IL" smtClean="0"/>
-              <a:t>25/01/2020</a:t>
+              <a:t>03/02/2020</a:t>
             </a:fld>
             <a:endParaRPr lang="en-IL"/>
           </a:p>
@@ -2944,7 +2946,7 @@
           <a:p>
             <a:fld id="{AA27FB6F-990B-4F02-B995-D654EC3D6263}" type="datetimeFigureOut">
               <a:rPr lang="en-IL" smtClean="0"/>
-              <a:t>25/01/2020</a:t>
+              <a:t>03/02/2020</a:t>
             </a:fld>
             <a:endParaRPr lang="en-IL"/>
           </a:p>
@@ -4318,8 +4320,8 @@
           </p:sp>
         </mc:Fallback>
       </mc:AlternateContent>
-      <mc:AlternateContent xmlns:mc="http://schemas.openxmlformats.org/markup-compatibility/2006">
-        <mc:Choice xmlns:a14="http://schemas.microsoft.com/office/drawing/2010/main" Requires="a14">
+      <mc:AlternateContent xmlns:mc="http://schemas.openxmlformats.org/markup-compatibility/2006" xmlns:a14="http://schemas.microsoft.com/office/drawing/2010/main">
+        <mc:Choice Requires="a14">
           <p:sp>
             <p:nvSpPr>
               <p:cNvPr id="43" name="TextBox 42">
@@ -4365,7 +4367,13 @@
                         <a:rPr lang="en-US" b="0" i="1" smtClean="0">
                           <a:latin typeface="Cambria Math" panose="02040503050406030204" pitchFamily="18" charset="0"/>
                         </a:rPr>
-                        <m:t>=1</m:t>
+                        <m:t>=</m:t>
+                      </m:r>
+                      <m:r>
+                        <a:rPr lang="en-US" b="0" i="1" smtClean="0">
+                          <a:latin typeface="Cambria Math" panose="02040503050406030204" pitchFamily="18" charset="0"/>
+                        </a:rPr>
+                        <m:t>1</m:t>
                       </m:r>
                       <m:d>
                         <m:dPr>
@@ -4394,7 +4402,7 @@
             </p:txBody>
           </p:sp>
         </mc:Choice>
-        <mc:Fallback>
+        <mc:Fallback xmlns="">
           <p:sp>
             <p:nvSpPr>
               <p:cNvPr id="43" name="TextBox 42">
@@ -4486,7 +4494,13 @@
                         <a:rPr lang="en-US" b="0" i="1" smtClean="0">
                           <a:latin typeface="Cambria Math" panose="02040503050406030204" pitchFamily="18" charset="0"/>
                         </a:rPr>
-                        <m:t>=1</m:t>
+                        <m:t>=</m:t>
+                      </m:r>
+                      <m:r>
+                        <a:rPr lang="en-US" b="0" i="1" smtClean="0">
+                          <a:latin typeface="Cambria Math" panose="02040503050406030204" pitchFamily="18" charset="0"/>
+                        </a:rPr>
+                        <m:t>1</m:t>
                       </m:r>
                       <m:d>
                         <m:dPr>
@@ -4530,7 +4544,13 @@
                         <a:rPr lang="en-US" b="0" i="1" smtClean="0">
                           <a:latin typeface="Cambria Math" panose="02040503050406030204" pitchFamily="18" charset="0"/>
                         </a:rPr>
-                        <m:t>=1</m:t>
+                        <m:t>=</m:t>
+                      </m:r>
+                      <m:r>
+                        <a:rPr lang="en-US" b="0" i="1" smtClean="0">
+                          <a:latin typeface="Cambria Math" panose="02040503050406030204" pitchFamily="18" charset="0"/>
+                        </a:rPr>
+                        <m:t>1</m:t>
                       </m:r>
                       <m:d>
                         <m:dPr>
@@ -4659,7 +4679,13 @@
                       <a:rPr lang="en-US" b="0" i="1" smtClean="0">
                         <a:latin typeface="Cambria Math" panose="02040503050406030204" pitchFamily="18" charset="0"/>
                       </a:rPr>
-                      <m:t>=1</m:t>
+                      <m:t>=</m:t>
+                    </m:r>
+                    <m:r>
+                      <a:rPr lang="en-US" b="0" i="1" smtClean="0">
+                        <a:latin typeface="Cambria Math" panose="02040503050406030204" pitchFamily="18" charset="0"/>
+                      </a:rPr>
+                      <m:t>10</m:t>
                     </m:r>
                     <m:d>
                       <m:dPr>
@@ -4676,7 +4702,7 @@
                           <a:rPr lang="en-US" b="0" i="1" smtClean="0">
                             <a:latin typeface="Cambria Math" panose="02040503050406030204" pitchFamily="18" charset="0"/>
                           </a:rPr>
-                          <m:t>𝑚𝑚</m:t>
+                          <m:t>𝑐𝑚</m:t>
                         </m:r>
                       </m:e>
                     </m:d>
@@ -4692,10 +4718,16 @@
                 <a14:m>
                   <m:oMath xmlns:m="http://schemas.openxmlformats.org/officeDocument/2006/math">
                     <m:r>
+                      <a:rPr lang="en-US" i="1">
+                        <a:latin typeface="Cambria Math" panose="02040503050406030204" pitchFamily="18" charset="0"/>
+                      </a:rPr>
+                      <m:t>2</m:t>
+                    </m:r>
+                    <m:r>
                       <a:rPr lang="en-US" b="0" i="1" smtClean="0">
                         <a:latin typeface="Cambria Math" panose="02040503050406030204" pitchFamily="18" charset="0"/>
                       </a:rPr>
-                      <m:t>100</m:t>
+                      <m:t>0</m:t>
                     </m:r>
                     <m:d>
                       <m:dPr>
@@ -5172,8 +5204,8 @@
           </a:fontRef>
         </p:style>
       </p:cxnSp>
-      <mc:AlternateContent xmlns:mc="http://schemas.openxmlformats.org/markup-compatibility/2006">
-        <mc:Choice xmlns:a14="http://schemas.microsoft.com/office/drawing/2010/main" Requires="a14">
+      <mc:AlternateContent xmlns:mc="http://schemas.openxmlformats.org/markup-compatibility/2006" xmlns:a14="http://schemas.microsoft.com/office/drawing/2010/main">
+        <mc:Choice Requires="a14">
           <p:sp>
             <p:nvSpPr>
               <p:cNvPr id="68" name="TextBox 67">
@@ -5213,13 +5245,7 @@
                         <a:rPr lang="en-US" b="0" i="1" smtClean="0">
                           <a:latin typeface="Cambria Math" panose="02040503050406030204" pitchFamily="18" charset="0"/>
                         </a:rPr>
-                        <m:t>𝐿</m:t>
-                      </m:r>
-                      <m:r>
-                        <a:rPr lang="en-US" b="0" i="1" smtClean="0">
-                          <a:latin typeface="Cambria Math" panose="02040503050406030204" pitchFamily="18" charset="0"/>
-                        </a:rPr>
-                        <m:t>𝑠𝑖𝑛</m:t>
+                        <m:t>𝐿𝑠𝑖𝑛</m:t>
                       </m:r>
                       <m:d>
                         <m:dPr>
@@ -5246,7 +5272,7 @@
             </p:txBody>
           </p:sp>
         </mc:Choice>
-        <mc:Fallback>
+        <mc:Fallback xmlns="">
           <p:sp>
             <p:nvSpPr>
               <p:cNvPr id="68" name="TextBox 67">
@@ -5707,6 +5733,286 @@
           </p:sp>
         </mc:Fallback>
       </mc:AlternateContent>
+      <p:sp>
+        <p:nvSpPr>
+          <p:cNvPr id="9" name="Freeform: Shape 8">
+            <a:extLst>
+              <a:ext uri="{FF2B5EF4-FFF2-40B4-BE49-F238E27FC236}">
+                <a16:creationId xmlns:a16="http://schemas.microsoft.com/office/drawing/2014/main" id="{D66031FD-FDCA-459F-B7CD-956B2AD32E6C}"/>
+              </a:ext>
+            </a:extLst>
+          </p:cNvPr>
+          <p:cNvSpPr/>
+          <p:nvPr/>
+        </p:nvSpPr>
+        <p:spPr>
+          <a:xfrm>
+            <a:off x="660056" y="653021"/>
+            <a:ext cx="2832009" cy="1190581"/>
+          </a:xfrm>
+          <a:custGeom>
+            <a:avLst/>
+            <a:gdLst>
+              <a:gd name="connsiteX0" fmla="*/ 0 w 2832009"/>
+              <a:gd name="connsiteY0" fmla="*/ 727905 h 1190581"/>
+              <a:gd name="connsiteX1" fmla="*/ 403412 w 2832009"/>
+              <a:gd name="connsiteY1" fmla="*/ 109340 h 1190581"/>
+              <a:gd name="connsiteX2" fmla="*/ 790687 w 2832009"/>
+              <a:gd name="connsiteY2" fmla="*/ 93204 h 1190581"/>
+              <a:gd name="connsiteX3" fmla="*/ 1463040 w 2832009"/>
+              <a:gd name="connsiteY3" fmla="*/ 1056013 h 1190581"/>
+              <a:gd name="connsiteX4" fmla="*/ 2753958 w 2832009"/>
+              <a:gd name="connsiteY4" fmla="*/ 1136696 h 1190581"/>
+              <a:gd name="connsiteX5" fmla="*/ 2641003 w 2832009"/>
+              <a:gd name="connsiteY5" fmla="*/ 614950 h 1190581"/>
+              <a:gd name="connsiteX6" fmla="*/ 2253727 w 2832009"/>
+              <a:gd name="connsiteY6" fmla="*/ 641844 h 1190581"/>
+              <a:gd name="connsiteX7" fmla="*/ 2436607 w 2832009"/>
+              <a:gd name="connsiteY7" fmla="*/ 910785 h 1190581"/>
+            </a:gdLst>
+            <a:ahLst/>
+            <a:cxnLst>
+              <a:cxn ang="0">
+                <a:pos x="connsiteX0" y="connsiteY0"/>
+              </a:cxn>
+              <a:cxn ang="0">
+                <a:pos x="connsiteX1" y="connsiteY1"/>
+              </a:cxn>
+              <a:cxn ang="0">
+                <a:pos x="connsiteX2" y="connsiteY2"/>
+              </a:cxn>
+              <a:cxn ang="0">
+                <a:pos x="connsiteX3" y="connsiteY3"/>
+              </a:cxn>
+              <a:cxn ang="0">
+                <a:pos x="connsiteX4" y="connsiteY4"/>
+              </a:cxn>
+              <a:cxn ang="0">
+                <a:pos x="connsiteX5" y="connsiteY5"/>
+              </a:cxn>
+              <a:cxn ang="0">
+                <a:pos x="connsiteX6" y="connsiteY6"/>
+              </a:cxn>
+              <a:cxn ang="0">
+                <a:pos x="connsiteX7" y="connsiteY7"/>
+              </a:cxn>
+            </a:cxnLst>
+            <a:rect l="l" t="t" r="r" b="b"/>
+            <a:pathLst>
+              <a:path w="2832009" h="1190581">
+                <a:moveTo>
+                  <a:pt x="0" y="727905"/>
+                </a:moveTo>
+                <a:cubicBezTo>
+                  <a:pt x="135815" y="471514"/>
+                  <a:pt x="271631" y="215123"/>
+                  <a:pt x="403412" y="109340"/>
+                </a:cubicBezTo>
+                <a:cubicBezTo>
+                  <a:pt x="535193" y="3557"/>
+                  <a:pt x="614082" y="-64575"/>
+                  <a:pt x="790687" y="93204"/>
+                </a:cubicBezTo>
+                <a:cubicBezTo>
+                  <a:pt x="967292" y="250983"/>
+                  <a:pt x="1135828" y="882098"/>
+                  <a:pt x="1463040" y="1056013"/>
+                </a:cubicBezTo>
+                <a:cubicBezTo>
+                  <a:pt x="1790252" y="1229928"/>
+                  <a:pt x="2557631" y="1210206"/>
+                  <a:pt x="2753958" y="1136696"/>
+                </a:cubicBezTo>
+                <a:cubicBezTo>
+                  <a:pt x="2950285" y="1063186"/>
+                  <a:pt x="2724375" y="697425"/>
+                  <a:pt x="2641003" y="614950"/>
+                </a:cubicBezTo>
+                <a:cubicBezTo>
+                  <a:pt x="2557631" y="532475"/>
+                  <a:pt x="2287793" y="592538"/>
+                  <a:pt x="2253727" y="641844"/>
+                </a:cubicBezTo>
+                <a:cubicBezTo>
+                  <a:pt x="2219661" y="691150"/>
+                  <a:pt x="2328134" y="800967"/>
+                  <a:pt x="2436607" y="910785"/>
+                </a:cubicBezTo>
+              </a:path>
+            </a:pathLst>
+          </a:custGeom>
+          <a:noFill/>
+          <a:ln w="57150">
+            <a:solidFill>
+              <a:srgbClr val="00B0F0"/>
+            </a:solidFill>
+          </a:ln>
+        </p:spPr>
+        <p:style>
+          <a:lnRef idx="2">
+            <a:schemeClr val="accent1">
+              <a:shade val="50000"/>
+            </a:schemeClr>
+          </a:lnRef>
+          <a:fillRef idx="1">
+            <a:schemeClr val="accent1"/>
+          </a:fillRef>
+          <a:effectRef idx="0">
+            <a:schemeClr val="accent1"/>
+          </a:effectRef>
+          <a:fontRef idx="minor">
+            <a:schemeClr val="lt1"/>
+          </a:fontRef>
+        </p:style>
+        <p:txBody>
+          <a:bodyPr rtlCol="0" anchor="ctr"/>
+          <a:lstStyle/>
+          <a:p>
+            <a:pPr algn="ctr"/>
+            <a:endParaRPr lang="en-IL"/>
+          </a:p>
+        </p:txBody>
+      </p:sp>
+      <p:sp>
+        <p:nvSpPr>
+          <p:cNvPr id="53" name="Freeform: Shape 52">
+            <a:extLst>
+              <a:ext uri="{FF2B5EF4-FFF2-40B4-BE49-F238E27FC236}">
+                <a16:creationId xmlns:a16="http://schemas.microsoft.com/office/drawing/2014/main" id="{62A12A35-E989-458D-92F3-7A5187D9FB16}"/>
+              </a:ext>
+            </a:extLst>
+          </p:cNvPr>
+          <p:cNvSpPr/>
+          <p:nvPr/>
+        </p:nvSpPr>
+        <p:spPr>
+          <a:xfrm>
+            <a:off x="1108035" y="924209"/>
+            <a:ext cx="2832009" cy="1190581"/>
+          </a:xfrm>
+          <a:custGeom>
+            <a:avLst/>
+            <a:gdLst>
+              <a:gd name="connsiteX0" fmla="*/ 0 w 2832009"/>
+              <a:gd name="connsiteY0" fmla="*/ 727905 h 1190581"/>
+              <a:gd name="connsiteX1" fmla="*/ 403412 w 2832009"/>
+              <a:gd name="connsiteY1" fmla="*/ 109340 h 1190581"/>
+              <a:gd name="connsiteX2" fmla="*/ 790687 w 2832009"/>
+              <a:gd name="connsiteY2" fmla="*/ 93204 h 1190581"/>
+              <a:gd name="connsiteX3" fmla="*/ 1463040 w 2832009"/>
+              <a:gd name="connsiteY3" fmla="*/ 1056013 h 1190581"/>
+              <a:gd name="connsiteX4" fmla="*/ 2753958 w 2832009"/>
+              <a:gd name="connsiteY4" fmla="*/ 1136696 h 1190581"/>
+              <a:gd name="connsiteX5" fmla="*/ 2641003 w 2832009"/>
+              <a:gd name="connsiteY5" fmla="*/ 614950 h 1190581"/>
+              <a:gd name="connsiteX6" fmla="*/ 2253727 w 2832009"/>
+              <a:gd name="connsiteY6" fmla="*/ 641844 h 1190581"/>
+              <a:gd name="connsiteX7" fmla="*/ 2436607 w 2832009"/>
+              <a:gd name="connsiteY7" fmla="*/ 910785 h 1190581"/>
+            </a:gdLst>
+            <a:ahLst/>
+            <a:cxnLst>
+              <a:cxn ang="0">
+                <a:pos x="connsiteX0" y="connsiteY0"/>
+              </a:cxn>
+              <a:cxn ang="0">
+                <a:pos x="connsiteX1" y="connsiteY1"/>
+              </a:cxn>
+              <a:cxn ang="0">
+                <a:pos x="connsiteX2" y="connsiteY2"/>
+              </a:cxn>
+              <a:cxn ang="0">
+                <a:pos x="connsiteX3" y="connsiteY3"/>
+              </a:cxn>
+              <a:cxn ang="0">
+                <a:pos x="connsiteX4" y="connsiteY4"/>
+              </a:cxn>
+              <a:cxn ang="0">
+                <a:pos x="connsiteX5" y="connsiteY5"/>
+              </a:cxn>
+              <a:cxn ang="0">
+                <a:pos x="connsiteX6" y="connsiteY6"/>
+              </a:cxn>
+              <a:cxn ang="0">
+                <a:pos x="connsiteX7" y="connsiteY7"/>
+              </a:cxn>
+            </a:cxnLst>
+            <a:rect l="l" t="t" r="r" b="b"/>
+            <a:pathLst>
+              <a:path w="2832009" h="1190581">
+                <a:moveTo>
+                  <a:pt x="0" y="727905"/>
+                </a:moveTo>
+                <a:cubicBezTo>
+                  <a:pt x="135815" y="471514"/>
+                  <a:pt x="271631" y="215123"/>
+                  <a:pt x="403412" y="109340"/>
+                </a:cubicBezTo>
+                <a:cubicBezTo>
+                  <a:pt x="535193" y="3557"/>
+                  <a:pt x="614082" y="-64575"/>
+                  <a:pt x="790687" y="93204"/>
+                </a:cubicBezTo>
+                <a:cubicBezTo>
+                  <a:pt x="967292" y="250983"/>
+                  <a:pt x="1135828" y="882098"/>
+                  <a:pt x="1463040" y="1056013"/>
+                </a:cubicBezTo>
+                <a:cubicBezTo>
+                  <a:pt x="1790252" y="1229928"/>
+                  <a:pt x="2557631" y="1210206"/>
+                  <a:pt x="2753958" y="1136696"/>
+                </a:cubicBezTo>
+                <a:cubicBezTo>
+                  <a:pt x="2950285" y="1063186"/>
+                  <a:pt x="2724375" y="697425"/>
+                  <a:pt x="2641003" y="614950"/>
+                </a:cubicBezTo>
+                <a:cubicBezTo>
+                  <a:pt x="2557631" y="532475"/>
+                  <a:pt x="2287793" y="592538"/>
+                  <a:pt x="2253727" y="641844"/>
+                </a:cubicBezTo>
+                <a:cubicBezTo>
+                  <a:pt x="2219661" y="691150"/>
+                  <a:pt x="2328134" y="800967"/>
+                  <a:pt x="2436607" y="910785"/>
+                </a:cubicBezTo>
+              </a:path>
+            </a:pathLst>
+          </a:custGeom>
+          <a:noFill/>
+          <a:ln w="57150">
+            <a:solidFill>
+              <a:srgbClr val="00B0F0"/>
+            </a:solidFill>
+          </a:ln>
+        </p:spPr>
+        <p:style>
+          <a:lnRef idx="2">
+            <a:schemeClr val="accent1">
+              <a:shade val="50000"/>
+            </a:schemeClr>
+          </a:lnRef>
+          <a:fillRef idx="1">
+            <a:schemeClr val="accent1"/>
+          </a:fillRef>
+          <a:effectRef idx="0">
+            <a:schemeClr val="accent1"/>
+          </a:effectRef>
+          <a:fontRef idx="minor">
+            <a:schemeClr val="lt1"/>
+          </a:fontRef>
+        </p:style>
+        <p:txBody>
+          <a:bodyPr rtlCol="0" anchor="ctr"/>
+          <a:lstStyle/>
+          <a:p>
+            <a:pPr algn="ctr"/>
+            <a:endParaRPr lang="en-IL"/>
+          </a:p>
+        </p:txBody>
+      </p:sp>
     </p:spTree>
     <p:extLst>
       <p:ext uri="{BB962C8B-B14F-4D97-AF65-F5344CB8AC3E}">
@@ -6231,8 +6537,8 @@
           </p:txBody>
         </p:sp>
       </p:grpSp>
-      <mc:AlternateContent xmlns:mc="http://schemas.openxmlformats.org/markup-compatibility/2006">
-        <mc:Choice xmlns:a14="http://schemas.microsoft.com/office/drawing/2010/main" Requires="a14">
+      <mc:AlternateContent xmlns:mc="http://schemas.openxmlformats.org/markup-compatibility/2006" xmlns:a14="http://schemas.microsoft.com/office/drawing/2010/main">
+        <mc:Choice Requires="a14">
           <p:sp>
             <p:nvSpPr>
               <p:cNvPr id="43" name="TextBox 42">
@@ -6278,7 +6584,13 @@
                         <a:rPr lang="en-US" b="0" i="1" smtClean="0">
                           <a:latin typeface="Cambria Math" panose="02040503050406030204" pitchFamily="18" charset="0"/>
                         </a:rPr>
-                        <m:t>=1</m:t>
+                        <m:t>=</m:t>
+                      </m:r>
+                      <m:r>
+                        <a:rPr lang="en-US" b="0" i="1" smtClean="0">
+                          <a:latin typeface="Cambria Math" panose="02040503050406030204" pitchFamily="18" charset="0"/>
+                        </a:rPr>
+                        <m:t>1</m:t>
                       </m:r>
                       <m:d>
                         <m:dPr>
@@ -6307,7 +6619,7 @@
             </p:txBody>
           </p:sp>
         </mc:Choice>
-        <mc:Fallback>
+        <mc:Fallback xmlns="">
           <p:sp>
             <p:nvSpPr>
               <p:cNvPr id="43" name="TextBox 42">
@@ -6399,7 +6711,13 @@
                         <a:rPr lang="en-US" b="0" i="1" smtClean="0">
                           <a:latin typeface="Cambria Math" panose="02040503050406030204" pitchFamily="18" charset="0"/>
                         </a:rPr>
-                        <m:t>=1</m:t>
+                        <m:t>=</m:t>
+                      </m:r>
+                      <m:r>
+                        <a:rPr lang="en-US" b="0" i="1" smtClean="0">
+                          <a:latin typeface="Cambria Math" panose="02040503050406030204" pitchFamily="18" charset="0"/>
+                        </a:rPr>
+                        <m:t>1</m:t>
                       </m:r>
                       <m:d>
                         <m:dPr>
@@ -6883,8 +7201,8 @@
           </a:fontRef>
         </p:style>
       </p:cxnSp>
-      <mc:AlternateContent xmlns:mc="http://schemas.openxmlformats.org/markup-compatibility/2006">
-        <mc:Choice xmlns:a14="http://schemas.microsoft.com/office/drawing/2010/main" Requires="a14">
+      <mc:AlternateContent xmlns:mc="http://schemas.openxmlformats.org/markup-compatibility/2006" xmlns:a14="http://schemas.microsoft.com/office/drawing/2010/main">
+        <mc:Choice Requires="a14">
           <p:sp>
             <p:nvSpPr>
               <p:cNvPr id="42" name="TextBox 41">
@@ -6924,13 +7242,7 @@
                         <a:rPr lang="en-US" b="0" i="1" smtClean="0">
                           <a:latin typeface="Cambria Math" panose="02040503050406030204" pitchFamily="18" charset="0"/>
                         </a:rPr>
-                        <m:t>𝐿</m:t>
-                      </m:r>
-                      <m:r>
-                        <a:rPr lang="en-US" b="0" i="1" smtClean="0">
-                          <a:latin typeface="Cambria Math" panose="02040503050406030204" pitchFamily="18" charset="0"/>
-                        </a:rPr>
-                        <m:t>𝑠𝑖𝑛</m:t>
+                        <m:t>𝐿𝑠𝑖𝑛</m:t>
                       </m:r>
                       <m:d>
                         <m:dPr>
@@ -6957,7 +7269,7 @@
             </p:txBody>
           </p:sp>
         </mc:Choice>
-        <mc:Fallback>
+        <mc:Fallback xmlns="">
           <p:sp>
             <p:nvSpPr>
               <p:cNvPr id="42" name="TextBox 41">
@@ -7197,7 +7509,13 @@
                       <a:rPr lang="en-US" b="0" i="1" smtClean="0">
                         <a:latin typeface="Cambria Math" panose="02040503050406030204" pitchFamily="18" charset="0"/>
                       </a:rPr>
-                      <m:t>=1</m:t>
+                      <m:t>=</m:t>
+                    </m:r>
+                    <m:r>
+                      <a:rPr lang="en-US" b="0" i="1" smtClean="0">
+                        <a:latin typeface="Cambria Math" panose="02040503050406030204" pitchFamily="18" charset="0"/>
+                      </a:rPr>
+                      <m:t>10</m:t>
                     </m:r>
                     <m:d>
                       <m:dPr>
@@ -7214,7 +7532,7 @@
                           <a:rPr lang="en-US" b="0" i="1" smtClean="0">
                             <a:latin typeface="Cambria Math" panose="02040503050406030204" pitchFamily="18" charset="0"/>
                           </a:rPr>
-                          <m:t>𝑚𝑚</m:t>
+                          <m:t>𝑐𝑚</m:t>
                         </m:r>
                       </m:e>
                     </m:d>
@@ -7230,10 +7548,16 @@
                 <a14:m>
                   <m:oMath xmlns:m="http://schemas.openxmlformats.org/officeDocument/2006/math">
                     <m:r>
+                      <a:rPr lang="en-US" i="1">
+                        <a:latin typeface="Cambria Math" panose="02040503050406030204" pitchFamily="18" charset="0"/>
+                      </a:rPr>
+                      <m:t>2</m:t>
+                    </m:r>
+                    <m:r>
                       <a:rPr lang="en-US" b="0" i="1" smtClean="0">
                         <a:latin typeface="Cambria Math" panose="02040503050406030204" pitchFamily="18" charset="0"/>
                       </a:rPr>
-                      <m:t>100</m:t>
+                      <m:t>0</m:t>
                     </m:r>
                     <m:d>
                       <m:dPr>
@@ -7306,6 +7630,286 @@
           </p:sp>
         </mc:Fallback>
       </mc:AlternateContent>
+      <p:sp>
+        <p:nvSpPr>
+          <p:cNvPr id="28" name="Freeform: Shape 27">
+            <a:extLst>
+              <a:ext uri="{FF2B5EF4-FFF2-40B4-BE49-F238E27FC236}">
+                <a16:creationId xmlns:a16="http://schemas.microsoft.com/office/drawing/2014/main" id="{54BCCB4F-0F6A-4407-B5FC-A7C4368B284B}"/>
+              </a:ext>
+            </a:extLst>
+          </p:cNvPr>
+          <p:cNvSpPr/>
+          <p:nvPr/>
+        </p:nvSpPr>
+        <p:spPr>
+          <a:xfrm>
+            <a:off x="660056" y="653021"/>
+            <a:ext cx="2832009" cy="1190581"/>
+          </a:xfrm>
+          <a:custGeom>
+            <a:avLst/>
+            <a:gdLst>
+              <a:gd name="connsiteX0" fmla="*/ 0 w 2832009"/>
+              <a:gd name="connsiteY0" fmla="*/ 727905 h 1190581"/>
+              <a:gd name="connsiteX1" fmla="*/ 403412 w 2832009"/>
+              <a:gd name="connsiteY1" fmla="*/ 109340 h 1190581"/>
+              <a:gd name="connsiteX2" fmla="*/ 790687 w 2832009"/>
+              <a:gd name="connsiteY2" fmla="*/ 93204 h 1190581"/>
+              <a:gd name="connsiteX3" fmla="*/ 1463040 w 2832009"/>
+              <a:gd name="connsiteY3" fmla="*/ 1056013 h 1190581"/>
+              <a:gd name="connsiteX4" fmla="*/ 2753958 w 2832009"/>
+              <a:gd name="connsiteY4" fmla="*/ 1136696 h 1190581"/>
+              <a:gd name="connsiteX5" fmla="*/ 2641003 w 2832009"/>
+              <a:gd name="connsiteY5" fmla="*/ 614950 h 1190581"/>
+              <a:gd name="connsiteX6" fmla="*/ 2253727 w 2832009"/>
+              <a:gd name="connsiteY6" fmla="*/ 641844 h 1190581"/>
+              <a:gd name="connsiteX7" fmla="*/ 2436607 w 2832009"/>
+              <a:gd name="connsiteY7" fmla="*/ 910785 h 1190581"/>
+            </a:gdLst>
+            <a:ahLst/>
+            <a:cxnLst>
+              <a:cxn ang="0">
+                <a:pos x="connsiteX0" y="connsiteY0"/>
+              </a:cxn>
+              <a:cxn ang="0">
+                <a:pos x="connsiteX1" y="connsiteY1"/>
+              </a:cxn>
+              <a:cxn ang="0">
+                <a:pos x="connsiteX2" y="connsiteY2"/>
+              </a:cxn>
+              <a:cxn ang="0">
+                <a:pos x="connsiteX3" y="connsiteY3"/>
+              </a:cxn>
+              <a:cxn ang="0">
+                <a:pos x="connsiteX4" y="connsiteY4"/>
+              </a:cxn>
+              <a:cxn ang="0">
+                <a:pos x="connsiteX5" y="connsiteY5"/>
+              </a:cxn>
+              <a:cxn ang="0">
+                <a:pos x="connsiteX6" y="connsiteY6"/>
+              </a:cxn>
+              <a:cxn ang="0">
+                <a:pos x="connsiteX7" y="connsiteY7"/>
+              </a:cxn>
+            </a:cxnLst>
+            <a:rect l="l" t="t" r="r" b="b"/>
+            <a:pathLst>
+              <a:path w="2832009" h="1190581">
+                <a:moveTo>
+                  <a:pt x="0" y="727905"/>
+                </a:moveTo>
+                <a:cubicBezTo>
+                  <a:pt x="135815" y="471514"/>
+                  <a:pt x="271631" y="215123"/>
+                  <a:pt x="403412" y="109340"/>
+                </a:cubicBezTo>
+                <a:cubicBezTo>
+                  <a:pt x="535193" y="3557"/>
+                  <a:pt x="614082" y="-64575"/>
+                  <a:pt x="790687" y="93204"/>
+                </a:cubicBezTo>
+                <a:cubicBezTo>
+                  <a:pt x="967292" y="250983"/>
+                  <a:pt x="1135828" y="882098"/>
+                  <a:pt x="1463040" y="1056013"/>
+                </a:cubicBezTo>
+                <a:cubicBezTo>
+                  <a:pt x="1790252" y="1229928"/>
+                  <a:pt x="2557631" y="1210206"/>
+                  <a:pt x="2753958" y="1136696"/>
+                </a:cubicBezTo>
+                <a:cubicBezTo>
+                  <a:pt x="2950285" y="1063186"/>
+                  <a:pt x="2724375" y="697425"/>
+                  <a:pt x="2641003" y="614950"/>
+                </a:cubicBezTo>
+                <a:cubicBezTo>
+                  <a:pt x="2557631" y="532475"/>
+                  <a:pt x="2287793" y="592538"/>
+                  <a:pt x="2253727" y="641844"/>
+                </a:cubicBezTo>
+                <a:cubicBezTo>
+                  <a:pt x="2219661" y="691150"/>
+                  <a:pt x="2328134" y="800967"/>
+                  <a:pt x="2436607" y="910785"/>
+                </a:cubicBezTo>
+              </a:path>
+            </a:pathLst>
+          </a:custGeom>
+          <a:noFill/>
+          <a:ln w="57150">
+            <a:solidFill>
+              <a:srgbClr val="00B0F0"/>
+            </a:solidFill>
+          </a:ln>
+        </p:spPr>
+        <p:style>
+          <a:lnRef idx="2">
+            <a:schemeClr val="accent1">
+              <a:shade val="50000"/>
+            </a:schemeClr>
+          </a:lnRef>
+          <a:fillRef idx="1">
+            <a:schemeClr val="accent1"/>
+          </a:fillRef>
+          <a:effectRef idx="0">
+            <a:schemeClr val="accent1"/>
+          </a:effectRef>
+          <a:fontRef idx="minor">
+            <a:schemeClr val="lt1"/>
+          </a:fontRef>
+        </p:style>
+        <p:txBody>
+          <a:bodyPr rtlCol="0" anchor="ctr"/>
+          <a:lstStyle/>
+          <a:p>
+            <a:pPr algn="ctr"/>
+            <a:endParaRPr lang="en-IL"/>
+          </a:p>
+        </p:txBody>
+      </p:sp>
+      <p:sp>
+        <p:nvSpPr>
+          <p:cNvPr id="32" name="Freeform: Shape 31">
+            <a:extLst>
+              <a:ext uri="{FF2B5EF4-FFF2-40B4-BE49-F238E27FC236}">
+                <a16:creationId xmlns:a16="http://schemas.microsoft.com/office/drawing/2014/main" id="{D7DB4E93-3A4C-45F7-BA28-558DE5D738CC}"/>
+              </a:ext>
+            </a:extLst>
+          </p:cNvPr>
+          <p:cNvSpPr/>
+          <p:nvPr/>
+        </p:nvSpPr>
+        <p:spPr>
+          <a:xfrm>
+            <a:off x="1108035" y="924209"/>
+            <a:ext cx="2832009" cy="1190581"/>
+          </a:xfrm>
+          <a:custGeom>
+            <a:avLst/>
+            <a:gdLst>
+              <a:gd name="connsiteX0" fmla="*/ 0 w 2832009"/>
+              <a:gd name="connsiteY0" fmla="*/ 727905 h 1190581"/>
+              <a:gd name="connsiteX1" fmla="*/ 403412 w 2832009"/>
+              <a:gd name="connsiteY1" fmla="*/ 109340 h 1190581"/>
+              <a:gd name="connsiteX2" fmla="*/ 790687 w 2832009"/>
+              <a:gd name="connsiteY2" fmla="*/ 93204 h 1190581"/>
+              <a:gd name="connsiteX3" fmla="*/ 1463040 w 2832009"/>
+              <a:gd name="connsiteY3" fmla="*/ 1056013 h 1190581"/>
+              <a:gd name="connsiteX4" fmla="*/ 2753958 w 2832009"/>
+              <a:gd name="connsiteY4" fmla="*/ 1136696 h 1190581"/>
+              <a:gd name="connsiteX5" fmla="*/ 2641003 w 2832009"/>
+              <a:gd name="connsiteY5" fmla="*/ 614950 h 1190581"/>
+              <a:gd name="connsiteX6" fmla="*/ 2253727 w 2832009"/>
+              <a:gd name="connsiteY6" fmla="*/ 641844 h 1190581"/>
+              <a:gd name="connsiteX7" fmla="*/ 2436607 w 2832009"/>
+              <a:gd name="connsiteY7" fmla="*/ 910785 h 1190581"/>
+            </a:gdLst>
+            <a:ahLst/>
+            <a:cxnLst>
+              <a:cxn ang="0">
+                <a:pos x="connsiteX0" y="connsiteY0"/>
+              </a:cxn>
+              <a:cxn ang="0">
+                <a:pos x="connsiteX1" y="connsiteY1"/>
+              </a:cxn>
+              <a:cxn ang="0">
+                <a:pos x="connsiteX2" y="connsiteY2"/>
+              </a:cxn>
+              <a:cxn ang="0">
+                <a:pos x="connsiteX3" y="connsiteY3"/>
+              </a:cxn>
+              <a:cxn ang="0">
+                <a:pos x="connsiteX4" y="connsiteY4"/>
+              </a:cxn>
+              <a:cxn ang="0">
+                <a:pos x="connsiteX5" y="connsiteY5"/>
+              </a:cxn>
+              <a:cxn ang="0">
+                <a:pos x="connsiteX6" y="connsiteY6"/>
+              </a:cxn>
+              <a:cxn ang="0">
+                <a:pos x="connsiteX7" y="connsiteY7"/>
+              </a:cxn>
+            </a:cxnLst>
+            <a:rect l="l" t="t" r="r" b="b"/>
+            <a:pathLst>
+              <a:path w="2832009" h="1190581">
+                <a:moveTo>
+                  <a:pt x="0" y="727905"/>
+                </a:moveTo>
+                <a:cubicBezTo>
+                  <a:pt x="135815" y="471514"/>
+                  <a:pt x="271631" y="215123"/>
+                  <a:pt x="403412" y="109340"/>
+                </a:cubicBezTo>
+                <a:cubicBezTo>
+                  <a:pt x="535193" y="3557"/>
+                  <a:pt x="614082" y="-64575"/>
+                  <a:pt x="790687" y="93204"/>
+                </a:cubicBezTo>
+                <a:cubicBezTo>
+                  <a:pt x="967292" y="250983"/>
+                  <a:pt x="1135828" y="882098"/>
+                  <a:pt x="1463040" y="1056013"/>
+                </a:cubicBezTo>
+                <a:cubicBezTo>
+                  <a:pt x="1790252" y="1229928"/>
+                  <a:pt x="2557631" y="1210206"/>
+                  <a:pt x="2753958" y="1136696"/>
+                </a:cubicBezTo>
+                <a:cubicBezTo>
+                  <a:pt x="2950285" y="1063186"/>
+                  <a:pt x="2724375" y="697425"/>
+                  <a:pt x="2641003" y="614950"/>
+                </a:cubicBezTo>
+                <a:cubicBezTo>
+                  <a:pt x="2557631" y="532475"/>
+                  <a:pt x="2287793" y="592538"/>
+                  <a:pt x="2253727" y="641844"/>
+                </a:cubicBezTo>
+                <a:cubicBezTo>
+                  <a:pt x="2219661" y="691150"/>
+                  <a:pt x="2328134" y="800967"/>
+                  <a:pt x="2436607" y="910785"/>
+                </a:cubicBezTo>
+              </a:path>
+            </a:pathLst>
+          </a:custGeom>
+          <a:noFill/>
+          <a:ln w="57150">
+            <a:solidFill>
+              <a:srgbClr val="00B0F0"/>
+            </a:solidFill>
+          </a:ln>
+        </p:spPr>
+        <p:style>
+          <a:lnRef idx="2">
+            <a:schemeClr val="accent1">
+              <a:shade val="50000"/>
+            </a:schemeClr>
+          </a:lnRef>
+          <a:fillRef idx="1">
+            <a:schemeClr val="accent1"/>
+          </a:fillRef>
+          <a:effectRef idx="0">
+            <a:schemeClr val="accent1"/>
+          </a:effectRef>
+          <a:fontRef idx="minor">
+            <a:schemeClr val="lt1"/>
+          </a:fontRef>
+        </p:style>
+        <p:txBody>
+          <a:bodyPr rtlCol="0" anchor="ctr"/>
+          <a:lstStyle/>
+          <a:p>
+            <a:pPr algn="ctr"/>
+            <a:endParaRPr lang="en-IL"/>
+          </a:p>
+        </p:txBody>
+      </p:sp>
     </p:spTree>
     <p:extLst>
       <p:ext uri="{BB962C8B-B14F-4D97-AF65-F5344CB8AC3E}">
@@ -7446,6 +8050,404 @@
     <p:extLst>
       <p:ext uri="{BB962C8B-B14F-4D97-AF65-F5344CB8AC3E}">
         <p14:creationId xmlns:p14="http://schemas.microsoft.com/office/powerpoint/2010/main" val="4155304810"/>
+      </p:ext>
+    </p:extLst>
+  </p:cSld>
+  <p:clrMapOvr>
+    <a:masterClrMapping/>
+  </p:clrMapOvr>
+</p:sld>
+</file>
+
+<file path=ppt/slides/slide4.xml><?xml version="1.0" encoding="utf-8"?>
+<p:sld xmlns:a="http://schemas.openxmlformats.org/drawingml/2006/main" xmlns:r="http://schemas.openxmlformats.org/officeDocument/2006/relationships" xmlns:p="http://schemas.openxmlformats.org/presentationml/2006/main">
+  <p:cSld>
+    <p:spTree>
+      <p:nvGrpSpPr>
+        <p:cNvPr id="1" name=""/>
+        <p:cNvGrpSpPr/>
+        <p:nvPr/>
+      </p:nvGrpSpPr>
+      <p:grpSpPr>
+        <a:xfrm>
+          <a:off x="0" y="0"/>
+          <a:ext cx="0" cy="0"/>
+          <a:chOff x="0" y="0"/>
+          <a:chExt cx="0" cy="0"/>
+        </a:xfrm>
+      </p:grpSpPr>
+      <p:pic>
+        <p:nvPicPr>
+          <p:cNvPr id="4" name="Picture 3">
+            <a:extLst>
+              <a:ext uri="{FF2B5EF4-FFF2-40B4-BE49-F238E27FC236}">
+                <a16:creationId xmlns:a16="http://schemas.microsoft.com/office/drawing/2014/main" id="{8D4BD0D4-60E5-437B-9240-1BB314631932}"/>
+              </a:ext>
+            </a:extLst>
+          </p:cNvPr>
+          <p:cNvPicPr/>
+          <p:nvPr/>
+        </p:nvPicPr>
+        <p:blipFill>
+          <a:blip r:embed="rId2"/>
+          <a:stretch>
+            <a:fillRect/>
+          </a:stretch>
+        </p:blipFill>
+        <p:spPr>
+          <a:xfrm>
+            <a:off x="1392806" y="1511450"/>
+            <a:ext cx="9406388" cy="3603376"/>
+          </a:xfrm>
+          <a:prstGeom prst="rect">
+            <a:avLst/>
+          </a:prstGeom>
+        </p:spPr>
+      </p:pic>
+    </p:spTree>
+    <p:extLst>
+      <p:ext uri="{BB962C8B-B14F-4D97-AF65-F5344CB8AC3E}">
+        <p14:creationId xmlns:p14="http://schemas.microsoft.com/office/powerpoint/2010/main" val="2099076957"/>
+      </p:ext>
+    </p:extLst>
+  </p:cSld>
+  <p:clrMapOvr>
+    <a:masterClrMapping/>
+  </p:clrMapOvr>
+</p:sld>
+</file>
+
+<file path=ppt/slides/slide5.xml><?xml version="1.0" encoding="utf-8"?>
+<p:sld xmlns:a="http://schemas.openxmlformats.org/drawingml/2006/main" xmlns:r="http://schemas.openxmlformats.org/officeDocument/2006/relationships" xmlns:p="http://schemas.openxmlformats.org/presentationml/2006/main">
+  <p:cSld>
+    <p:spTree>
+      <p:nvGrpSpPr>
+        <p:cNvPr id="1" name=""/>
+        <p:cNvGrpSpPr/>
+        <p:nvPr/>
+      </p:nvGrpSpPr>
+      <p:grpSpPr>
+        <a:xfrm>
+          <a:off x="0" y="0"/>
+          <a:ext cx="0" cy="0"/>
+          <a:chOff x="0" y="0"/>
+          <a:chExt cx="0" cy="0"/>
+        </a:xfrm>
+      </p:grpSpPr>
+      <p:pic>
+        <p:nvPicPr>
+          <p:cNvPr id="4" name="Picture 3">
+            <a:extLst>
+              <a:ext uri="{FF2B5EF4-FFF2-40B4-BE49-F238E27FC236}">
+                <a16:creationId xmlns:a16="http://schemas.microsoft.com/office/drawing/2014/main" id="{25D5DF3F-C5F4-4EF9-BA96-3CD63B33B4A4}"/>
+              </a:ext>
+            </a:extLst>
+          </p:cNvPr>
+          <p:cNvPicPr>
+            <a:picLocks noChangeAspect="1"/>
+          </p:cNvPicPr>
+          <p:nvPr/>
+        </p:nvPicPr>
+        <p:blipFill>
+          <a:blip r:embed="rId2"/>
+          <a:stretch>
+            <a:fillRect/>
+          </a:stretch>
+        </p:blipFill>
+        <p:spPr>
+          <a:xfrm>
+            <a:off x="828339" y="1841515"/>
+            <a:ext cx="10273553" cy="3174970"/>
+          </a:xfrm>
+          <a:prstGeom prst="rect">
+            <a:avLst/>
+          </a:prstGeom>
+        </p:spPr>
+      </p:pic>
+      <p:sp>
+        <p:nvSpPr>
+          <p:cNvPr id="5" name="Oval 4">
+            <a:extLst>
+              <a:ext uri="{FF2B5EF4-FFF2-40B4-BE49-F238E27FC236}">
+                <a16:creationId xmlns:a16="http://schemas.microsoft.com/office/drawing/2014/main" id="{A6710098-EAA9-4DC6-89C8-3F2A3F9239EC}"/>
+              </a:ext>
+            </a:extLst>
+          </p:cNvPr>
+          <p:cNvSpPr/>
+          <p:nvPr/>
+        </p:nvSpPr>
+        <p:spPr>
+          <a:xfrm>
+            <a:off x="6277087" y="2167666"/>
+            <a:ext cx="1662057" cy="1409252"/>
+          </a:xfrm>
+          <a:prstGeom prst="ellipse">
+            <a:avLst/>
+          </a:prstGeom>
+          <a:noFill/>
+          <a:ln w="38100">
+            <a:solidFill>
+              <a:srgbClr val="FF0000"/>
+            </a:solidFill>
+          </a:ln>
+        </p:spPr>
+        <p:style>
+          <a:lnRef idx="2">
+            <a:schemeClr val="accent1">
+              <a:shade val="50000"/>
+            </a:schemeClr>
+          </a:lnRef>
+          <a:fillRef idx="1">
+            <a:schemeClr val="accent1"/>
+          </a:fillRef>
+          <a:effectRef idx="0">
+            <a:schemeClr val="accent1"/>
+          </a:effectRef>
+          <a:fontRef idx="minor">
+            <a:schemeClr val="lt1"/>
+          </a:fontRef>
+        </p:style>
+        <p:txBody>
+          <a:bodyPr rtlCol="0" anchor="ctr"/>
+          <a:lstStyle/>
+          <a:p>
+            <a:pPr algn="ctr"/>
+            <a:endParaRPr lang="en-IL"/>
+          </a:p>
+        </p:txBody>
+      </p:sp>
+      <p:sp>
+        <p:nvSpPr>
+          <p:cNvPr id="6" name="TextBox 5">
+            <a:extLst>
+              <a:ext uri="{FF2B5EF4-FFF2-40B4-BE49-F238E27FC236}">
+                <a16:creationId xmlns:a16="http://schemas.microsoft.com/office/drawing/2014/main" id="{9D819322-7A22-4564-B486-AE92AC136E7E}"/>
+              </a:ext>
+            </a:extLst>
+          </p:cNvPr>
+          <p:cNvSpPr txBox="1"/>
+          <p:nvPr/>
+        </p:nvSpPr>
+        <p:spPr>
+          <a:xfrm>
+            <a:off x="6096000" y="720762"/>
+            <a:ext cx="4757008" cy="646331"/>
+          </a:xfrm>
+          <a:prstGeom prst="rect">
+            <a:avLst/>
+          </a:prstGeom>
+          <a:noFill/>
+        </p:spPr>
+        <p:txBody>
+          <a:bodyPr wrap="none" rtlCol="0">
+            <a:spAutoFit/>
+          </a:bodyPr>
+          <a:lstStyle/>
+          <a:p>
+            <a:r>
+              <a:rPr lang="en-US" dirty="0">
+                <a:solidFill>
+                  <a:srgbClr val="FF0000"/>
+                </a:solidFill>
+              </a:rPr>
+              <a:t>Rate Transition from continuous to Control Time</a:t>
+            </a:r>
+            <a:br>
+              <a:rPr lang="en-US" dirty="0">
+                <a:solidFill>
+                  <a:srgbClr val="FF0000"/>
+                </a:solidFill>
+              </a:rPr>
+            </a:br>
+            <a:r>
+              <a:rPr lang="en-US" dirty="0">
+                <a:solidFill>
+                  <a:srgbClr val="FF0000"/>
+                </a:solidFill>
+              </a:rPr>
+              <a:t>Zero Order Hold</a:t>
+            </a:r>
+            <a:endParaRPr lang="en-IL" dirty="0">
+              <a:solidFill>
+                <a:srgbClr val="FF0000"/>
+              </a:solidFill>
+            </a:endParaRPr>
+          </a:p>
+        </p:txBody>
+      </p:sp>
+      <p:cxnSp>
+        <p:nvCxnSpPr>
+          <p:cNvPr id="8" name="Straight Arrow Connector 7">
+            <a:extLst>
+              <a:ext uri="{FF2B5EF4-FFF2-40B4-BE49-F238E27FC236}">
+                <a16:creationId xmlns:a16="http://schemas.microsoft.com/office/drawing/2014/main" id="{691B0BCF-6AB7-4B70-9E8B-54B6FB5539BC}"/>
+              </a:ext>
+            </a:extLst>
+          </p:cNvPr>
+          <p:cNvCxnSpPr/>
+          <p:nvPr/>
+        </p:nvCxnSpPr>
+        <p:spPr>
+          <a:xfrm flipH="1">
+            <a:off x="7524974" y="1511449"/>
+            <a:ext cx="414170" cy="656217"/>
+          </a:xfrm>
+          <a:prstGeom prst="straightConnector1">
+            <a:avLst/>
+          </a:prstGeom>
+          <a:ln w="57150">
+            <a:solidFill>
+              <a:srgbClr val="FF0000"/>
+            </a:solidFill>
+            <a:tailEnd type="triangle"/>
+          </a:ln>
+        </p:spPr>
+        <p:style>
+          <a:lnRef idx="1">
+            <a:schemeClr val="accent1"/>
+          </a:lnRef>
+          <a:fillRef idx="0">
+            <a:schemeClr val="accent1"/>
+          </a:fillRef>
+          <a:effectRef idx="0">
+            <a:schemeClr val="accent1"/>
+          </a:effectRef>
+          <a:fontRef idx="minor">
+            <a:schemeClr val="tx1"/>
+          </a:fontRef>
+        </p:style>
+      </p:cxnSp>
+      <p:pic>
+        <p:nvPicPr>
+          <p:cNvPr id="9" name="Picture 8">
+            <a:extLst>
+              <a:ext uri="{FF2B5EF4-FFF2-40B4-BE49-F238E27FC236}">
+                <a16:creationId xmlns:a16="http://schemas.microsoft.com/office/drawing/2014/main" id="{E2D759EC-764A-4014-B450-28C168E08A69}"/>
+              </a:ext>
+            </a:extLst>
+          </p:cNvPr>
+          <p:cNvPicPr>
+            <a:picLocks noChangeAspect="1"/>
+          </p:cNvPicPr>
+          <p:nvPr/>
+        </p:nvPicPr>
+        <p:blipFill>
+          <a:blip r:embed="rId3"/>
+          <a:stretch>
+            <a:fillRect/>
+          </a:stretch>
+        </p:blipFill>
+        <p:spPr>
+          <a:xfrm>
+            <a:off x="258183" y="444765"/>
+            <a:ext cx="5217459" cy="919863"/>
+          </a:xfrm>
+          <a:prstGeom prst="rect">
+            <a:avLst/>
+          </a:prstGeom>
+        </p:spPr>
+      </p:pic>
+      <p:sp>
+        <p:nvSpPr>
+          <p:cNvPr id="10" name="Oval 9">
+            <a:extLst>
+              <a:ext uri="{FF2B5EF4-FFF2-40B4-BE49-F238E27FC236}">
+                <a16:creationId xmlns:a16="http://schemas.microsoft.com/office/drawing/2014/main" id="{A82C07E8-BF42-412F-8C3F-3662F28DBFDB}"/>
+              </a:ext>
+            </a:extLst>
+          </p:cNvPr>
+          <p:cNvSpPr/>
+          <p:nvPr/>
+        </p:nvSpPr>
+        <p:spPr>
+          <a:xfrm>
+            <a:off x="4711848" y="2167666"/>
+            <a:ext cx="1662057" cy="1511449"/>
+          </a:xfrm>
+          <a:prstGeom prst="ellipse">
+            <a:avLst/>
+          </a:prstGeom>
+          <a:noFill/>
+          <a:ln w="57150">
+            <a:solidFill>
+              <a:srgbClr val="7030A0"/>
+            </a:solidFill>
+          </a:ln>
+        </p:spPr>
+        <p:style>
+          <a:lnRef idx="2">
+            <a:schemeClr val="accent1">
+              <a:shade val="50000"/>
+            </a:schemeClr>
+          </a:lnRef>
+          <a:fillRef idx="1">
+            <a:schemeClr val="accent1"/>
+          </a:fillRef>
+          <a:effectRef idx="0">
+            <a:schemeClr val="accent1"/>
+          </a:effectRef>
+          <a:fontRef idx="minor">
+            <a:schemeClr val="lt1"/>
+          </a:fontRef>
+        </p:style>
+        <p:txBody>
+          <a:bodyPr rtlCol="0" anchor="ctr"/>
+          <a:lstStyle/>
+          <a:p>
+            <a:pPr algn="ctr"/>
+            <a:endParaRPr lang="en-IL"/>
+          </a:p>
+        </p:txBody>
+      </p:sp>
+      <p:cxnSp>
+        <p:nvCxnSpPr>
+          <p:cNvPr id="12" name="Straight Arrow Connector 11">
+            <a:extLst>
+              <a:ext uri="{FF2B5EF4-FFF2-40B4-BE49-F238E27FC236}">
+                <a16:creationId xmlns:a16="http://schemas.microsoft.com/office/drawing/2014/main" id="{35D7569B-4798-46D3-ADEE-B63F520D7E9C}"/>
+              </a:ext>
+            </a:extLst>
+          </p:cNvPr>
+          <p:cNvCxnSpPr>
+            <a:cxnSpLocks/>
+            <a:stCxn id="10" idx="1"/>
+          </p:cNvCxnSpPr>
+          <p:nvPr/>
+        </p:nvCxnSpPr>
+        <p:spPr>
+          <a:xfrm flipH="1" flipV="1">
+            <a:off x="3996467" y="1323107"/>
+            <a:ext cx="958784" cy="1065906"/>
+          </a:xfrm>
+          <a:prstGeom prst="straightConnector1">
+            <a:avLst/>
+          </a:prstGeom>
+          <a:ln w="38100">
+            <a:solidFill>
+              <a:srgbClr val="7030A0"/>
+            </a:solidFill>
+            <a:tailEnd type="triangle"/>
+          </a:ln>
+        </p:spPr>
+        <p:style>
+          <a:lnRef idx="1">
+            <a:schemeClr val="accent1"/>
+          </a:lnRef>
+          <a:fillRef idx="0">
+            <a:schemeClr val="accent1"/>
+          </a:fillRef>
+          <a:effectRef idx="0">
+            <a:schemeClr val="accent1"/>
+          </a:effectRef>
+          <a:fontRef idx="minor">
+            <a:schemeClr val="tx1"/>
+          </a:fontRef>
+        </p:style>
+      </p:cxnSp>
+    </p:spTree>
+    <p:extLst>
+      <p:ext uri="{BB962C8B-B14F-4D97-AF65-F5344CB8AC3E}">
+        <p14:creationId xmlns:p14="http://schemas.microsoft.com/office/powerpoint/2010/main" val="2222577845"/>
       </p:ext>
     </p:extLst>
   </p:cSld>

</xml_diff>